<commit_message>
Added progress bar and error handling
</commit_message>
<xml_diff>
--- a/src/webapi/wwwroot/assets/PolicyTemplate.pptx
+++ b/src/webapi/wwwroot/assets/PolicyTemplate.pptx
@@ -8,7 +8,7 @@
     <p:sldId id="260" r:id="rId2">
       <p:extLst>
         <p:ext uri="{E3EDB536-0D56-4F60-86BA-61A60CA02DAB}">
-          <p202:designTagLst xmlns="" xmlns:p202="http://schemas.microsoft.com/office/powerpoint/2020/02/main">
+          <p202:designTagLst xmlns:p202="http://schemas.microsoft.com/office/powerpoint/2020/02/main" xmlns="">
             <p202:designTag name="BPID" val="{C6E6426D-2491-47A8-88A2-38DF3ABB6023}"/>
           </p202:designTagLst>
         </p:ext>
@@ -262,7 +262,7 @@
           <a:p>
             <a:fld id="{CF5C660C-50E5-B242-B3EF-2B7C8DA67512}" type="datetimeFigureOut">
               <a:rPr lang="en-US" smtClean="0"/>
-              <a:t>3/6/2023</a:t>
+              <a:t>3/9/2023</a:t>
             </a:fld>
             <a:endParaRPr lang="en-US"/>
           </a:p>
@@ -432,7 +432,7 @@
           <a:p>
             <a:fld id="{CF5C660C-50E5-B242-B3EF-2B7C8DA67512}" type="datetimeFigureOut">
               <a:rPr lang="en-US" smtClean="0"/>
-              <a:t>3/6/2023</a:t>
+              <a:t>3/9/2023</a:t>
             </a:fld>
             <a:endParaRPr lang="en-US"/>
           </a:p>
@@ -612,7 +612,7 @@
           <a:p>
             <a:fld id="{CF5C660C-50E5-B242-B3EF-2B7C8DA67512}" type="datetimeFigureOut">
               <a:rPr lang="en-US" smtClean="0"/>
-              <a:t>3/6/2023</a:t>
+              <a:t>3/9/2023</a:t>
             </a:fld>
             <a:endParaRPr lang="en-US"/>
           </a:p>
@@ -782,7 +782,7 @@
           <a:p>
             <a:fld id="{CF5C660C-50E5-B242-B3EF-2B7C8DA67512}" type="datetimeFigureOut">
               <a:rPr lang="en-US" smtClean="0"/>
-              <a:t>3/6/2023</a:t>
+              <a:t>3/9/2023</a:t>
             </a:fld>
             <a:endParaRPr lang="en-US"/>
           </a:p>
@@ -1028,7 +1028,7 @@
           <a:p>
             <a:fld id="{CF5C660C-50E5-B242-B3EF-2B7C8DA67512}" type="datetimeFigureOut">
               <a:rPr lang="en-US" smtClean="0"/>
-              <a:t>3/6/2023</a:t>
+              <a:t>3/9/2023</a:t>
             </a:fld>
             <a:endParaRPr lang="en-US"/>
           </a:p>
@@ -1260,7 +1260,7 @@
           <a:p>
             <a:fld id="{CF5C660C-50E5-B242-B3EF-2B7C8DA67512}" type="datetimeFigureOut">
               <a:rPr lang="en-US" smtClean="0"/>
-              <a:t>3/6/2023</a:t>
+              <a:t>3/9/2023</a:t>
             </a:fld>
             <a:endParaRPr lang="en-US"/>
           </a:p>
@@ -1627,7 +1627,7 @@
           <a:p>
             <a:fld id="{CF5C660C-50E5-B242-B3EF-2B7C8DA67512}" type="datetimeFigureOut">
               <a:rPr lang="en-US" smtClean="0"/>
-              <a:t>3/6/2023</a:t>
+              <a:t>3/9/2023</a:t>
             </a:fld>
             <a:endParaRPr lang="en-US"/>
           </a:p>
@@ -1745,7 +1745,7 @@
           <a:p>
             <a:fld id="{CF5C660C-50E5-B242-B3EF-2B7C8DA67512}" type="datetimeFigureOut">
               <a:rPr lang="en-US" smtClean="0"/>
-              <a:t>3/6/2023</a:t>
+              <a:t>3/9/2023</a:t>
             </a:fld>
             <a:endParaRPr lang="en-US"/>
           </a:p>
@@ -1840,7 +1840,7 @@
           <a:p>
             <a:fld id="{CF5C660C-50E5-B242-B3EF-2B7C8DA67512}" type="datetimeFigureOut">
               <a:rPr lang="en-US" smtClean="0"/>
-              <a:t>3/6/2023</a:t>
+              <a:t>3/9/2023</a:t>
             </a:fld>
             <a:endParaRPr lang="en-US"/>
           </a:p>
@@ -2117,7 +2117,7 @@
           <a:p>
             <a:fld id="{CF5C660C-50E5-B242-B3EF-2B7C8DA67512}" type="datetimeFigureOut">
               <a:rPr lang="en-US" smtClean="0"/>
-              <a:t>3/6/2023</a:t>
+              <a:t>3/9/2023</a:t>
             </a:fld>
             <a:endParaRPr lang="en-US"/>
           </a:p>
@@ -2374,7 +2374,7 @@
           <a:p>
             <a:fld id="{CF5C660C-50E5-B242-B3EF-2B7C8DA67512}" type="datetimeFigureOut">
               <a:rPr lang="en-US" smtClean="0"/>
-              <a:t>3/6/2023</a:t>
+              <a:t>3/9/2023</a:t>
             </a:fld>
             <a:endParaRPr lang="en-US"/>
           </a:p>
@@ -2587,7 +2587,7 @@
           <a:p>
             <a:fld id="{CF5C660C-50E5-B242-B3EF-2B7C8DA67512}" type="datetimeFigureOut">
               <a:rPr lang="en-US" smtClean="0"/>
-              <a:t>3/6/2023</a:t>
+              <a:t>3/9/2023</a:t>
             </a:fld>
             <a:endParaRPr lang="en-US"/>
           </a:p>
@@ -3084,7 +3084,7 @@
         </p:nvSpPr>
         <p:spPr>
           <a:xfrm>
-            <a:off x="1155558" y="637762"/>
+            <a:off x="794092" y="640615"/>
             <a:ext cx="4284397" cy="5576770"/>
           </a:xfrm>
         </p:spPr>
@@ -3094,7 +3094,6 @@
           </a:bodyPr>
           <a:lstStyle/>
           <a:p>
-            <a:pPr algn="l"/>
             <a:r>
               <a:rPr lang="en-US" sz="5100" dirty="0">
                 <a:solidFill>
@@ -3103,52 +3102,6 @@
               </a:rPr>
               <a:t>Conditional Access Policy Documentation</a:t>
             </a:r>
-          </a:p>
-        </p:txBody>
-      </p:sp>
-      <p:sp>
-        <p:nvSpPr>
-          <p:cNvPr id="4" name="TextBox 3">
-            <a:extLst>
-              <a:ext uri="{FF2B5EF4-FFF2-40B4-BE49-F238E27FC236}">
-                <a16:creationId xmlns:a16="http://schemas.microsoft.com/office/drawing/2014/main" id="{023452AA-46C3-4AA6-414B-41443B567970}"/>
-              </a:ext>
-            </a:extLst>
-          </p:cNvPr>
-          <p:cNvSpPr txBox="1"/>
-          <p:nvPr/>
-        </p:nvSpPr>
-        <p:spPr>
-          <a:xfrm>
-            <a:off x="981635" y="6383991"/>
-            <a:ext cx="3416641" cy="369332"/>
-          </a:xfrm>
-          <a:prstGeom prst="rect">
-            <a:avLst/>
-          </a:prstGeom>
-          <a:noFill/>
-        </p:spPr>
-        <p:txBody>
-          <a:bodyPr wrap="none" rtlCol="0">
-            <a:spAutoFit/>
-          </a:bodyPr>
-          <a:lstStyle/>
-          <a:p>
-            <a:r>
-              <a:rPr lang="en-AU" dirty="0">
-                <a:solidFill>
-                  <a:schemeClr val="bg1"/>
-                </a:solidFill>
-              </a:rPr>
-              <a:t>Generated using </a:t>
-            </a:r>
-            <a:r>
-              <a:rPr lang="en-AU" dirty="0">
-                <a:hlinkClick r:id="rId2"/>
-              </a:rPr>
-              <a:t>cadoc.merill.net</a:t>
-            </a:r>
-            <a:endParaRPr lang="en-US" dirty="0"/>
           </a:p>
         </p:txBody>
       </p:sp>
@@ -4044,10 +3997,10 @@
           <p:nvPr/>
         </p:nvPicPr>
         <p:blipFill>
-          <a:blip r:embed="rId3">
+          <a:blip r:embed="rId2">
             <a:extLst>
               <a:ext uri="{96DAC541-7B7A-43D3-8B79-37D633B846F1}">
-                <asvg:svgBlip xmlns:asvg="http://schemas.microsoft.com/office/drawing/2016/SVG/main" r:embed="rId4"/>
+                <asvg:svgBlip xmlns:asvg="http://schemas.microsoft.com/office/drawing/2016/SVG/main" r:embed="rId3"/>
               </a:ext>
             </a:extLst>
           </a:blip>
@@ -4059,6 +4012,87 @@
           <a:xfrm>
             <a:off x="2225576" y="570682"/>
             <a:ext cx="1421431" cy="1421431"/>
+          </a:xfrm>
+          <a:prstGeom prst="rect">
+            <a:avLst/>
+          </a:prstGeom>
+        </p:spPr>
+      </p:pic>
+      <p:sp>
+        <p:nvSpPr>
+          <p:cNvPr id="4" name="TextBox 3">
+            <a:extLst>
+              <a:ext uri="{FF2B5EF4-FFF2-40B4-BE49-F238E27FC236}">
+                <a16:creationId xmlns:a16="http://schemas.microsoft.com/office/drawing/2014/main" id="{023452AA-46C3-4AA6-414B-41443B567970}"/>
+              </a:ext>
+            </a:extLst>
+          </p:cNvPr>
+          <p:cNvSpPr txBox="1"/>
+          <p:nvPr/>
+        </p:nvSpPr>
+        <p:spPr>
+          <a:xfrm>
+            <a:off x="310122" y="6539219"/>
+            <a:ext cx="918841" cy="253916"/>
+          </a:xfrm>
+          <a:prstGeom prst="rect">
+            <a:avLst/>
+          </a:prstGeom>
+          <a:noFill/>
+        </p:spPr>
+        <p:txBody>
+          <a:bodyPr wrap="none" rtlCol="0">
+            <a:spAutoFit/>
+          </a:bodyPr>
+          <a:lstStyle/>
+          <a:p>
+            <a:r>
+              <a:rPr lang="en-AU" sz="1050" dirty="0">
+                <a:solidFill>
+                  <a:schemeClr val="bg1"/>
+                </a:solidFill>
+                <a:hlinkClick r:id="rId4">
+                  <a:extLst>
+                    <a:ext uri="{A12FA001-AC4F-418D-AE19-62706E023703}">
+                      <ahyp:hlinkClr xmlns:ahyp="http://schemas.microsoft.com/office/drawing/2018/hyperlinkcolor" val="tx"/>
+                    </a:ext>
+                  </a:extLst>
+                </a:hlinkClick>
+              </a:rPr>
+              <a:t>idPowerToys</a:t>
+            </a:r>
+            <a:endParaRPr lang="en-US" sz="1050" dirty="0">
+              <a:solidFill>
+                <a:schemeClr val="bg1"/>
+              </a:solidFill>
+            </a:endParaRPr>
+          </a:p>
+        </p:txBody>
+      </p:sp>
+      <p:pic>
+        <p:nvPicPr>
+          <p:cNvPr id="9" name="Picture 8" descr="A picture containing vector graphics&#10;&#10;Description automatically generated">
+            <a:extLst>
+              <a:ext uri="{FF2B5EF4-FFF2-40B4-BE49-F238E27FC236}">
+                <a16:creationId xmlns:a16="http://schemas.microsoft.com/office/drawing/2014/main" id="{EA472C66-DE96-7875-6713-8DBFE61CDB83}"/>
+              </a:ext>
+            </a:extLst>
+          </p:cNvPr>
+          <p:cNvPicPr>
+            <a:picLocks noChangeAspect="1"/>
+          </p:cNvPicPr>
+          <p:nvPr/>
+        </p:nvPicPr>
+        <p:blipFill>
+          <a:blip r:embed="rId5"/>
+          <a:stretch>
+            <a:fillRect/>
+          </a:stretch>
+        </p:blipFill>
+        <p:spPr>
+          <a:xfrm>
+            <a:off x="126203" y="6553200"/>
+            <a:ext cx="206902" cy="206902"/>
           </a:xfrm>
           <a:prstGeom prst="rect">
             <a:avLst/>
@@ -4245,7 +4279,7 @@
           </a:lstStyle>
           <a:p>
             <a:r>
-              <a:rPr lang="en-US" sz="1050" b="1" dirty="0"/>
+              <a:rPr lang="en-US" sz="1600" b="1" dirty="0"/>
               <a:t>Identity</a:t>
             </a:r>
           </a:p>
@@ -4998,15 +5032,15 @@
           </a:lstStyle>
           <a:p>
             <a:r>
-              <a:rPr lang="en-US" sz="1050" b="1" dirty="0"/>
+              <a:rPr lang="en-US" sz="1600" b="1" dirty="0"/>
               <a:t>&lt;</a:t>
             </a:r>
             <a:r>
-              <a:rPr lang="en-US" sz="1050" b="1" dirty="0" err="1"/>
+              <a:rPr lang="en-US" sz="1600" b="1" dirty="0" err="1"/>
               <a:t>CloudAppAction</a:t>
             </a:r>
             <a:r>
-              <a:rPr lang="en-US" sz="1050" b="1" dirty="0"/>
+              <a:rPr lang="en-US" sz="1600" b="1" dirty="0"/>
               <a:t>&gt;</a:t>
             </a:r>
           </a:p>

</xml_diff>

<commit_message>
Added images for Register info
</commit_message>
<xml_diff>
--- a/src/webapi/wwwroot/assets/PolicyTemplate.pptx
+++ b/src/webapi/wwwroot/assets/PolicyTemplate.pptx
@@ -8,7 +8,7 @@
     <p:sldId id="260" r:id="rId2">
       <p:extLst>
         <p:ext uri="{E3EDB536-0D56-4F60-86BA-61A60CA02DAB}">
-          <p202:designTagLst xmlns:p202="http://schemas.microsoft.com/office/powerpoint/2020/02/main" xmlns="">
+          <p202:designTagLst xmlns="" xmlns:p202="http://schemas.microsoft.com/office/powerpoint/2020/02/main">
             <p202:designTag name="BPID" val="{C6E6426D-2491-47A8-88A2-38DF3ABB6023}"/>
           </p202:designTagLst>
         </p:ext>
@@ -4349,15 +4349,15 @@
           <a:lstStyle/>
           <a:p>
             <a:r>
-              <a:rPr lang="en-US" sz="1000" dirty="0"/>
+              <a:rPr lang="en-US" sz="1100" dirty="0"/>
               <a:t>&lt;</a:t>
             </a:r>
             <a:r>
-              <a:rPr lang="en-US" sz="1000" dirty="0" err="1"/>
+              <a:rPr lang="en-US" sz="1100" dirty="0" err="1"/>
               <a:t>UserWorkloadIncExc</a:t>
             </a:r>
             <a:r>
-              <a:rPr lang="en-US" sz="1000" dirty="0"/>
+              <a:rPr lang="en-US" sz="1100" dirty="0"/>
               <a:t>&gt;</a:t>
             </a:r>
           </a:p>
@@ -4517,7 +4517,7 @@
         </p:nvSpPr>
         <p:spPr>
           <a:xfrm>
-            <a:off x="5392263" y="1021947"/>
+            <a:off x="5818151" y="1095590"/>
             <a:ext cx="2248808" cy="1648514"/>
           </a:xfrm>
           <a:prstGeom prst="rect">
@@ -4553,9 +4553,9 @@
           <p:nvPr/>
         </p:nvCxnSpPr>
         <p:spPr>
-          <a:xfrm flipV="1">
-            <a:off x="2195232" y="3156864"/>
-            <a:ext cx="3792071" cy="2183"/>
+          <a:xfrm>
+            <a:off x="2195232" y="3159047"/>
+            <a:ext cx="3959471" cy="1"/>
           </a:xfrm>
           <a:prstGeom prst="straightConnector1">
             <a:avLst/>
@@ -4760,15 +4760,15 @@
           <a:lstStyle/>
           <a:p>
             <a:r>
-              <a:rPr lang="en-US" sz="1000" dirty="0"/>
+              <a:rPr lang="en-US" sz="1100" dirty="0"/>
               <a:t>&lt;</a:t>
             </a:r>
             <a:r>
-              <a:rPr lang="en-US" sz="1000" dirty="0" err="1"/>
+              <a:rPr lang="en-US" sz="1100" dirty="0" err="1"/>
               <a:t>CloudAppActionIncExc</a:t>
             </a:r>
             <a:r>
-              <a:rPr lang="en-US" sz="1000" dirty="0"/>
+              <a:rPr lang="en-US" sz="1100" dirty="0"/>
               <a:t>&gt;</a:t>
             </a:r>
           </a:p>
@@ -4896,8 +4896,8 @@
         </p:nvSpPr>
         <p:spPr bwMode="auto">
           <a:xfrm>
-            <a:off x="6027913" y="2718506"/>
-            <a:ext cx="3686361" cy="898556"/>
+            <a:off x="6206089" y="2718506"/>
+            <a:ext cx="3227026" cy="898556"/>
           </a:xfrm>
           <a:prstGeom prst="roundRect">
             <a:avLst>
@@ -5033,15 +5033,7 @@
           <a:p>
             <a:r>
               <a:rPr lang="en-US" sz="1600" b="1" dirty="0"/>
-              <a:t>&lt;</a:t>
-            </a:r>
-            <a:r>
-              <a:rPr lang="en-US" sz="1600" b="1" dirty="0" err="1"/>
-              <a:t>CloudAppAction</a:t>
-            </a:r>
-            <a:r>
-              <a:rPr lang="en-US" sz="1600" b="1" dirty="0"/>
-              <a:t>&gt;</a:t>
+              <a:t>Register security information</a:t>
             </a:r>
           </a:p>
         </p:txBody>
@@ -5074,7 +5066,7 @@
         </p:blipFill>
         <p:spPr>
           <a:xfrm>
-            <a:off x="6285302" y="2882544"/>
+            <a:off x="6463478" y="2882544"/>
             <a:ext cx="548640" cy="548640"/>
           </a:xfrm>
           <a:prstGeom prst="rect">
@@ -5110,7 +5102,7 @@
         </p:blipFill>
         <p:spPr>
           <a:xfrm>
-            <a:off x="6261088" y="2882544"/>
+            <a:off x="6439264" y="2882544"/>
             <a:ext cx="548640" cy="548640"/>
           </a:xfrm>
           <a:prstGeom prst="rect">
@@ -5146,7 +5138,7 @@
         </p:blipFill>
         <p:spPr>
           <a:xfrm>
-            <a:off x="6273195" y="2882544"/>
+            <a:off x="6451371" y="2882544"/>
             <a:ext cx="548640" cy="548640"/>
           </a:xfrm>
           <a:prstGeom prst="rect">
@@ -5182,7 +5174,7 @@
         </p:blipFill>
         <p:spPr>
           <a:xfrm>
-            <a:off x="6301142" y="2882544"/>
+            <a:off x="6479318" y="2882544"/>
             <a:ext cx="548640" cy="548640"/>
           </a:xfrm>
           <a:prstGeom prst="rect">
@@ -5218,7 +5210,7 @@
         </p:blipFill>
         <p:spPr>
           <a:xfrm>
-            <a:off x="6295804" y="2882544"/>
+            <a:off x="6473980" y="2882544"/>
             <a:ext cx="548640" cy="548640"/>
           </a:xfrm>
           <a:prstGeom prst="rect">
@@ -5254,7 +5246,7 @@
         </p:blipFill>
         <p:spPr>
           <a:xfrm>
-            <a:off x="6261088" y="2836824"/>
+            <a:off x="6439264" y="2836824"/>
             <a:ext cx="640080" cy="640080"/>
           </a:xfrm>
           <a:prstGeom prst="rect">
@@ -6469,7 +6461,7 @@
         </p:blipFill>
         <p:spPr>
           <a:xfrm>
-            <a:off x="6273195" y="2882544"/>
+            <a:off x="6451371" y="2882544"/>
             <a:ext cx="548640" cy="548640"/>
           </a:xfrm>
           <a:prstGeom prst="rect">
@@ -8683,6 +8675,95 @@
           <a:xfrm>
             <a:off x="2390750" y="2724875"/>
             <a:ext cx="365760" cy="365760"/>
+          </a:xfrm>
+          <a:prstGeom prst="rect">
+            <a:avLst/>
+          </a:prstGeom>
+        </p:spPr>
+      </p:pic>
+      <p:pic>
+        <p:nvPicPr>
+          <p:cNvPr id="61" name="PicAccessSecurityInfo" descr="Graphical user interface, text, application, email&#10;&#10;Description automatically generated">
+            <a:extLst>
+              <a:ext uri="{FF2B5EF4-FFF2-40B4-BE49-F238E27FC236}">
+                <a16:creationId xmlns:a16="http://schemas.microsoft.com/office/drawing/2014/main" id="{E018A236-4A83-4263-D21B-8A6DE614E535}"/>
+              </a:ext>
+            </a:extLst>
+          </p:cNvPr>
+          <p:cNvPicPr>
+            <a:picLocks noChangeAspect="1"/>
+          </p:cNvPicPr>
+          <p:nvPr/>
+        </p:nvPicPr>
+        <p:blipFill>
+          <a:blip r:embed="rId71"/>
+          <a:stretch>
+            <a:fillRect/>
+          </a:stretch>
+        </p:blipFill>
+        <p:spPr>
+          <a:xfrm>
+            <a:off x="6019248" y="3736425"/>
+            <a:ext cx="3673090" cy="2094172"/>
+          </a:xfrm>
+          <a:prstGeom prst="rect">
+            <a:avLst/>
+          </a:prstGeom>
+        </p:spPr>
+      </p:pic>
+      <p:pic>
+        <p:nvPicPr>
+          <p:cNvPr id="125" name="PicAccessRegisterDevice" descr="Graphical user interface, application&#10;&#10;Description automatically generated">
+            <a:extLst>
+              <a:ext uri="{FF2B5EF4-FFF2-40B4-BE49-F238E27FC236}">
+                <a16:creationId xmlns:a16="http://schemas.microsoft.com/office/drawing/2014/main" id="{A3B3F247-FF69-447F-E182-652ADEE608FC}"/>
+              </a:ext>
+            </a:extLst>
+          </p:cNvPr>
+          <p:cNvPicPr>
+            <a:picLocks noChangeAspect="1"/>
+          </p:cNvPicPr>
+          <p:nvPr/>
+        </p:nvPicPr>
+        <p:blipFill rotWithShape="1">
+          <a:blip r:embed="rId72"/>
+          <a:srcRect r="4400" b="6054"/>
+          <a:stretch/>
+        </p:blipFill>
+        <p:spPr>
+          <a:xfrm>
+            <a:off x="5896533" y="3744401"/>
+            <a:ext cx="3874103" cy="2163097"/>
+          </a:xfrm>
+          <a:prstGeom prst="rect">
+            <a:avLst/>
+          </a:prstGeom>
+        </p:spPr>
+      </p:pic>
+      <p:pic>
+        <p:nvPicPr>
+          <p:cNvPr id="22" name="PicAccessOffice365" descr="Graphical user interface, application&#10;&#10;Description automatically generated">
+            <a:extLst>
+              <a:ext uri="{FF2B5EF4-FFF2-40B4-BE49-F238E27FC236}">
+                <a16:creationId xmlns:a16="http://schemas.microsoft.com/office/drawing/2014/main" id="{FB86B396-B8F8-888C-26D4-BFF08146B38B}"/>
+              </a:ext>
+            </a:extLst>
+          </p:cNvPr>
+          <p:cNvPicPr>
+            <a:picLocks noChangeAspect="1"/>
+          </p:cNvPicPr>
+          <p:nvPr/>
+        </p:nvPicPr>
+        <p:blipFill>
+          <a:blip r:embed="rId73"/>
+          <a:stretch>
+            <a:fillRect/>
+          </a:stretch>
+        </p:blipFill>
+        <p:spPr>
+          <a:xfrm>
+            <a:off x="6673101" y="3457952"/>
+            <a:ext cx="2328560" cy="3498547"/>
           </a:xfrm>
           <a:prstGeom prst="rect">
             <a:avLst/>

</xml_diff>

<commit_message>
Added token binding and CAE strict support
</commit_message>
<xml_diff>
--- a/src/webapi/wwwroot/assets/PolicyTemplate.pptx
+++ b/src/webapi/wwwroot/assets/PolicyTemplate.pptx
@@ -8,7 +8,7 @@
     <p:sldId id="260" r:id="rId2">
       <p:extLst>
         <p:ext uri="{E3EDB536-0D56-4F60-86BA-61A60CA02DAB}">
-          <p202:designTagLst xmlns="" xmlns:p202="http://schemas.microsoft.com/office/powerpoint/2020/02/main">
+          <p202:designTagLst xmlns:p202="http://schemas.microsoft.com/office/powerpoint/2020/02/main">
             <p202:designTag name="BPID" val="{C6E6426D-2491-47A8-88A2-38DF3ABB6023}"/>
           </p202:designTagLst>
         </p:ext>
@@ -262,7 +262,7 @@
           <a:p>
             <a:fld id="{CF5C660C-50E5-B242-B3EF-2B7C8DA67512}" type="datetimeFigureOut">
               <a:rPr lang="en-US" smtClean="0"/>
-              <a:t>3/9/2023</a:t>
+              <a:t>3/13/23</a:t>
             </a:fld>
             <a:endParaRPr lang="en-US"/>
           </a:p>
@@ -432,7 +432,7 @@
           <a:p>
             <a:fld id="{CF5C660C-50E5-B242-B3EF-2B7C8DA67512}" type="datetimeFigureOut">
               <a:rPr lang="en-US" smtClean="0"/>
-              <a:t>3/9/2023</a:t>
+              <a:t>3/13/23</a:t>
             </a:fld>
             <a:endParaRPr lang="en-US"/>
           </a:p>
@@ -612,7 +612,7 @@
           <a:p>
             <a:fld id="{CF5C660C-50E5-B242-B3EF-2B7C8DA67512}" type="datetimeFigureOut">
               <a:rPr lang="en-US" smtClean="0"/>
-              <a:t>3/9/2023</a:t>
+              <a:t>3/13/23</a:t>
             </a:fld>
             <a:endParaRPr lang="en-US"/>
           </a:p>
@@ -782,7 +782,7 @@
           <a:p>
             <a:fld id="{CF5C660C-50E5-B242-B3EF-2B7C8DA67512}" type="datetimeFigureOut">
               <a:rPr lang="en-US" smtClean="0"/>
-              <a:t>3/9/2023</a:t>
+              <a:t>3/13/23</a:t>
             </a:fld>
             <a:endParaRPr lang="en-US"/>
           </a:p>
@@ -1028,7 +1028,7 @@
           <a:p>
             <a:fld id="{CF5C660C-50E5-B242-B3EF-2B7C8DA67512}" type="datetimeFigureOut">
               <a:rPr lang="en-US" smtClean="0"/>
-              <a:t>3/9/2023</a:t>
+              <a:t>3/13/23</a:t>
             </a:fld>
             <a:endParaRPr lang="en-US"/>
           </a:p>
@@ -1260,7 +1260,7 @@
           <a:p>
             <a:fld id="{CF5C660C-50E5-B242-B3EF-2B7C8DA67512}" type="datetimeFigureOut">
               <a:rPr lang="en-US" smtClean="0"/>
-              <a:t>3/9/2023</a:t>
+              <a:t>3/13/23</a:t>
             </a:fld>
             <a:endParaRPr lang="en-US"/>
           </a:p>
@@ -1627,7 +1627,7 @@
           <a:p>
             <a:fld id="{CF5C660C-50E5-B242-B3EF-2B7C8DA67512}" type="datetimeFigureOut">
               <a:rPr lang="en-US" smtClean="0"/>
-              <a:t>3/9/2023</a:t>
+              <a:t>3/13/23</a:t>
             </a:fld>
             <a:endParaRPr lang="en-US"/>
           </a:p>
@@ -1745,7 +1745,7 @@
           <a:p>
             <a:fld id="{CF5C660C-50E5-B242-B3EF-2B7C8DA67512}" type="datetimeFigureOut">
               <a:rPr lang="en-US" smtClean="0"/>
-              <a:t>3/9/2023</a:t>
+              <a:t>3/13/23</a:t>
             </a:fld>
             <a:endParaRPr lang="en-US"/>
           </a:p>
@@ -1840,7 +1840,7 @@
           <a:p>
             <a:fld id="{CF5C660C-50E5-B242-B3EF-2B7C8DA67512}" type="datetimeFigureOut">
               <a:rPr lang="en-US" smtClean="0"/>
-              <a:t>3/9/2023</a:t>
+              <a:t>3/13/23</a:t>
             </a:fld>
             <a:endParaRPr lang="en-US"/>
           </a:p>
@@ -2117,7 +2117,7 @@
           <a:p>
             <a:fld id="{CF5C660C-50E5-B242-B3EF-2B7C8DA67512}" type="datetimeFigureOut">
               <a:rPr lang="en-US" smtClean="0"/>
-              <a:t>3/9/2023</a:t>
+              <a:t>3/13/23</a:t>
             </a:fld>
             <a:endParaRPr lang="en-US"/>
           </a:p>
@@ -2374,7 +2374,7 @@
           <a:p>
             <a:fld id="{CF5C660C-50E5-B242-B3EF-2B7C8DA67512}" type="datetimeFigureOut">
               <a:rPr lang="en-US" smtClean="0"/>
-              <a:t>3/9/2023</a:t>
+              <a:t>3/13/23</a:t>
             </a:fld>
             <a:endParaRPr lang="en-US"/>
           </a:p>
@@ -2587,7 +2587,7 @@
           <a:p>
             <a:fld id="{CF5C660C-50E5-B242-B3EF-2B7C8DA67512}" type="datetimeFigureOut">
               <a:rPr lang="en-US" smtClean="0"/>
-              <a:t>3/9/2023</a:t>
+              <a:t>3/13/23</a:t>
             </a:fld>
             <a:endParaRPr lang="en-US"/>
           </a:p>
@@ -8025,42 +8025,6 @@
           </a:prstGeom>
         </p:spPr>
       </p:pic>
-      <p:pic>
-        <p:nvPicPr>
-          <p:cNvPr id="113" name="Graphic 112">
-            <a:extLst>
-              <a:ext uri="{FF2B5EF4-FFF2-40B4-BE49-F238E27FC236}">
-                <a16:creationId xmlns:a16="http://schemas.microsoft.com/office/drawing/2014/main" id="{35C6C9E9-8BF8-1EBC-D557-8EA6B790E383}"/>
-              </a:ext>
-            </a:extLst>
-          </p:cNvPr>
-          <p:cNvPicPr>
-            <a:picLocks noChangeAspect="1"/>
-          </p:cNvPicPr>
-          <p:nvPr/>
-        </p:nvPicPr>
-        <p:blipFill>
-          <a:blip r:embed="rId63">
-            <a:extLst>
-              <a:ext uri="{96DAC541-7B7A-43D3-8B79-37D633B846F1}">
-                <asvg:svgBlip xmlns:asvg="http://schemas.microsoft.com/office/drawing/2016/SVG/main" r:embed="rId64"/>
-              </a:ext>
-            </a:extLst>
-          </a:blip>
-          <a:stretch>
-            <a:fillRect/>
-          </a:stretch>
-        </p:blipFill>
-        <p:spPr>
-          <a:xfrm>
-            <a:off x="10038088" y="5661826"/>
-            <a:ext cx="228600" cy="228600"/>
-          </a:xfrm>
-          <a:prstGeom prst="rect">
-            <a:avLst/>
-          </a:prstGeom>
-        </p:spPr>
-      </p:pic>
       <p:sp>
         <p:nvSpPr>
           <p:cNvPr id="115" name="SessionSifInterval">
@@ -8180,8 +8144,8 @@
         </p:nvSpPr>
         <p:spPr>
           <a:xfrm>
-            <a:off x="10301387" y="5393378"/>
-            <a:ext cx="490840" cy="215444"/>
+            <a:off x="10301386" y="5393378"/>
+            <a:ext cx="1535997" cy="215444"/>
           </a:xfrm>
           <a:prstGeom prst="rect">
             <a:avLst/>
@@ -8189,14 +8153,14 @@
           <a:noFill/>
         </p:spPr>
         <p:txBody>
-          <a:bodyPr wrap="none" rtlCol="0">
+          <a:bodyPr wrap="square" rtlCol="0">
             <a:spAutoFit/>
           </a:bodyPr>
           <a:lstStyle/>
           <a:p>
             <a:r>
               <a:rPr lang="en-US" sz="800" dirty="0"/>
-              <a:t>Disable</a:t>
+              <a:t>Strictly enforce location policies</a:t>
             </a:r>
           </a:p>
         </p:txBody>
@@ -8383,8 +8347,8 @@
         </p:nvSpPr>
         <p:spPr>
           <a:xfrm>
-            <a:off x="9902635" y="4755942"/>
-            <a:ext cx="1987008" cy="369332"/>
+            <a:off x="9938833" y="4746195"/>
+            <a:ext cx="1856273" cy="369332"/>
           </a:xfrm>
           <a:prstGeom prst="rect">
             <a:avLst/>
@@ -8427,10 +8391,10 @@
       </p:sp>
       <p:pic>
         <p:nvPicPr>
-          <p:cNvPr id="16" name="Graphic 15" descr="Badge Cross with solid fill">
-            <a:extLst>
-              <a:ext uri="{FF2B5EF4-FFF2-40B4-BE49-F238E27FC236}">
-                <a16:creationId xmlns:a16="http://schemas.microsoft.com/office/drawing/2014/main" id="{B983FB2A-08C7-5072-3DCC-DFAA3419F255}"/>
+          <p:cNvPr id="70" name="IconAssignedToRole">
+            <a:extLst>
+              <a:ext uri="{FF2B5EF4-FFF2-40B4-BE49-F238E27FC236}">
+                <a16:creationId xmlns:a16="http://schemas.microsoft.com/office/drawing/2014/main" id="{A8B5B9F2-9715-28D8-3E21-42BFCC74E9DE}"/>
               </a:ext>
             </a:extLst>
           </p:cNvPr>
@@ -8440,10 +8404,10 @@
           <p:nvPr/>
         </p:nvPicPr>
         <p:blipFill>
-          <a:blip r:embed="rId65">
+          <a:blip r:embed="rId63">
             <a:extLst>
               <a:ext uri="{96DAC541-7B7A-43D3-8B79-37D633B846F1}">
-                <asvg:svgBlip xmlns:asvg="http://schemas.microsoft.com/office/drawing/2016/SVG/main" r:embed="rId66"/>
+                <asvg:svgBlip xmlns:asvg="http://schemas.microsoft.com/office/drawing/2016/SVG/main" r:embed="rId64"/>
               </a:ext>
             </a:extLst>
           </a:blip>
@@ -8453,8 +8417,8 @@
         </p:blipFill>
         <p:spPr>
           <a:xfrm>
-            <a:off x="10223191" y="5754127"/>
-            <a:ext cx="76470" cy="76470"/>
+            <a:off x="2391841" y="3225674"/>
+            <a:ext cx="365760" cy="365760"/>
           </a:xfrm>
           <a:prstGeom prst="rect">
             <a:avLst/>
@@ -8463,10 +8427,10 @@
       </p:pic>
       <p:pic>
         <p:nvPicPr>
-          <p:cNvPr id="18" name="Graphic 17" descr="Badge Cross with solid fill">
-            <a:extLst>
-              <a:ext uri="{FF2B5EF4-FFF2-40B4-BE49-F238E27FC236}">
-                <a16:creationId xmlns:a16="http://schemas.microsoft.com/office/drawing/2014/main" id="{E793FF3B-3D08-0094-8CB0-0141CCA49A81}"/>
+          <p:cNvPr id="73" name="IconAssignedToGuest">
+            <a:extLst>
+              <a:ext uri="{FF2B5EF4-FFF2-40B4-BE49-F238E27FC236}">
+                <a16:creationId xmlns:a16="http://schemas.microsoft.com/office/drawing/2014/main" id="{D0269B9B-9063-91D4-5CCB-150E8BCADC85}"/>
               </a:ext>
             </a:extLst>
           </p:cNvPr>
@@ -8489,14 +8453,213 @@
         </p:blipFill>
         <p:spPr>
           <a:xfrm>
-            <a:off x="10207559" y="5387077"/>
-            <a:ext cx="76470" cy="76470"/>
+            <a:off x="2390750" y="2724875"/>
+            <a:ext cx="365760" cy="365760"/>
           </a:xfrm>
           <a:prstGeom prst="rect">
             <a:avLst/>
           </a:prstGeom>
         </p:spPr>
       </p:pic>
+      <p:pic>
+        <p:nvPicPr>
+          <p:cNvPr id="61" name="PicAccessSecurityInfo" descr="Graphical user interface, text, application, email&#10;&#10;Description automatically generated">
+            <a:extLst>
+              <a:ext uri="{FF2B5EF4-FFF2-40B4-BE49-F238E27FC236}">
+                <a16:creationId xmlns:a16="http://schemas.microsoft.com/office/drawing/2014/main" id="{E018A236-4A83-4263-D21B-8A6DE614E535}"/>
+              </a:ext>
+            </a:extLst>
+          </p:cNvPr>
+          <p:cNvPicPr>
+            <a:picLocks noChangeAspect="1"/>
+          </p:cNvPicPr>
+          <p:nvPr/>
+        </p:nvPicPr>
+        <p:blipFill>
+          <a:blip r:embed="rId67"/>
+          <a:stretch>
+            <a:fillRect/>
+          </a:stretch>
+        </p:blipFill>
+        <p:spPr>
+          <a:xfrm>
+            <a:off x="6019248" y="3736425"/>
+            <a:ext cx="3673090" cy="2094172"/>
+          </a:xfrm>
+          <a:prstGeom prst="rect">
+            <a:avLst/>
+          </a:prstGeom>
+        </p:spPr>
+      </p:pic>
+      <p:pic>
+        <p:nvPicPr>
+          <p:cNvPr id="125" name="PicAccessRegisterDevice" descr="Graphical user interface, application&#10;&#10;Description automatically generated">
+            <a:extLst>
+              <a:ext uri="{FF2B5EF4-FFF2-40B4-BE49-F238E27FC236}">
+                <a16:creationId xmlns:a16="http://schemas.microsoft.com/office/drawing/2014/main" id="{A3B3F247-FF69-447F-E182-652ADEE608FC}"/>
+              </a:ext>
+            </a:extLst>
+          </p:cNvPr>
+          <p:cNvPicPr>
+            <a:picLocks noChangeAspect="1"/>
+          </p:cNvPicPr>
+          <p:nvPr/>
+        </p:nvPicPr>
+        <p:blipFill rotWithShape="1">
+          <a:blip r:embed="rId68"/>
+          <a:srcRect r="4400" b="6054"/>
+          <a:stretch/>
+        </p:blipFill>
+        <p:spPr>
+          <a:xfrm>
+            <a:off x="5896533" y="3744401"/>
+            <a:ext cx="3874103" cy="2163097"/>
+          </a:xfrm>
+          <a:prstGeom prst="rect">
+            <a:avLst/>
+          </a:prstGeom>
+        </p:spPr>
+      </p:pic>
+      <p:pic>
+        <p:nvPicPr>
+          <p:cNvPr id="22" name="PicAccessOffice365" descr="Graphical user interface, application&#10;&#10;Description automatically generated">
+            <a:extLst>
+              <a:ext uri="{FF2B5EF4-FFF2-40B4-BE49-F238E27FC236}">
+                <a16:creationId xmlns:a16="http://schemas.microsoft.com/office/drawing/2014/main" id="{FB86B396-B8F8-888C-26D4-BFF08146B38B}"/>
+              </a:ext>
+            </a:extLst>
+          </p:cNvPr>
+          <p:cNvPicPr>
+            <a:picLocks noChangeAspect="1"/>
+          </p:cNvPicPr>
+          <p:nvPr/>
+        </p:nvPicPr>
+        <p:blipFill>
+          <a:blip r:embed="rId69"/>
+          <a:stretch>
+            <a:fillRect/>
+          </a:stretch>
+        </p:blipFill>
+        <p:spPr>
+          <a:xfrm>
+            <a:off x="6673101" y="3457952"/>
+            <a:ext cx="2328560" cy="3498547"/>
+          </a:xfrm>
+          <a:prstGeom prst="rect">
+            <a:avLst/>
+          </a:prstGeom>
+        </p:spPr>
+      </p:pic>
+      <p:sp>
+        <p:nvSpPr>
+          <p:cNvPr id="12" name="Label Secure Sign In Session">
+            <a:extLst>
+              <a:ext uri="{FF2B5EF4-FFF2-40B4-BE49-F238E27FC236}">
+                <a16:creationId xmlns:a16="http://schemas.microsoft.com/office/drawing/2014/main" id="{6F1625EE-BC13-2FC3-69BE-BAA6F3A9771A}"/>
+              </a:ext>
+            </a:extLst>
+          </p:cNvPr>
+          <p:cNvSpPr txBox="1"/>
+          <p:nvPr/>
+        </p:nvSpPr>
+        <p:spPr>
+          <a:xfrm>
+            <a:off x="10260000" y="6084874"/>
+            <a:ext cx="1665841" cy="246221"/>
+          </a:xfrm>
+          <a:prstGeom prst="rect">
+            <a:avLst/>
+          </a:prstGeom>
+          <a:noFill/>
+        </p:spPr>
+        <p:txBody>
+          <a:bodyPr wrap="none" rtlCol="0">
+            <a:spAutoFit/>
+          </a:bodyPr>
+          <a:lstStyle/>
+          <a:p>
+            <a:r>
+              <a:rPr lang="en-US" sz="1000" dirty="0"/>
+              <a:t>Token protection for session</a:t>
+            </a:r>
+          </a:p>
+        </p:txBody>
+      </p:sp>
+      <p:pic>
+        <p:nvPicPr>
+          <p:cNvPr id="77" name="IconSessionCaeDisable" descr="Close with solid fill">
+            <a:extLst>
+              <a:ext uri="{FF2B5EF4-FFF2-40B4-BE49-F238E27FC236}">
+                <a16:creationId xmlns:a16="http://schemas.microsoft.com/office/drawing/2014/main" id="{566407B2-CF64-97B5-68FD-83F428A2BB9C}"/>
+              </a:ext>
+            </a:extLst>
+          </p:cNvPr>
+          <p:cNvPicPr>
+            <a:picLocks noChangeAspect="1"/>
+          </p:cNvPicPr>
+          <p:nvPr/>
+        </p:nvPicPr>
+        <p:blipFill>
+          <a:blip r:embed="rId70">
+            <a:extLst>
+              <a:ext uri="{28A0092B-C50C-407E-A947-70E740481C1C}">
+                <a14:useLocalDpi xmlns:a14="http://schemas.microsoft.com/office/drawing/2010/main" val="0"/>
+              </a:ext>
+              <a:ext uri="{96DAC541-7B7A-43D3-8B79-37D633B846F1}">
+                <asvg:svgBlip xmlns:asvg="http://schemas.microsoft.com/office/drawing/2016/SVG/main" r:embed="rId71"/>
+              </a:ext>
+            </a:extLst>
+          </a:blip>
+          <a:stretch>
+            <a:fillRect/>
+          </a:stretch>
+        </p:blipFill>
+        <p:spPr>
+          <a:xfrm>
+            <a:off x="9979885" y="5218651"/>
+            <a:ext cx="296075" cy="296075"/>
+          </a:xfrm>
+          <a:prstGeom prst="rect">
+            <a:avLst/>
+          </a:prstGeom>
+        </p:spPr>
+      </p:pic>
+      <p:pic>
+        <p:nvPicPr>
+          <p:cNvPr id="92" name="IconSessionSecureSignInSession 1">
+            <a:extLst>
+              <a:ext uri="{FF2B5EF4-FFF2-40B4-BE49-F238E27FC236}">
+                <a16:creationId xmlns:a16="http://schemas.microsoft.com/office/drawing/2014/main" id="{8B5A7F4A-351F-5BD1-3C4F-D9A9FA8B0C6D}"/>
+              </a:ext>
+            </a:extLst>
+          </p:cNvPr>
+          <p:cNvPicPr>
+            <a:picLocks noChangeAspect="1"/>
+          </p:cNvPicPr>
+          <p:nvPr/>
+        </p:nvPicPr>
+        <p:blipFill>
+          <a:blip r:embed="rId72">
+            <a:extLst>
+              <a:ext uri="{96DAC541-7B7A-43D3-8B79-37D633B846F1}">
+                <asvg:svgBlip xmlns:asvg="http://schemas.microsoft.com/office/drawing/2016/SVG/main" r:embed="rId73"/>
+              </a:ext>
+            </a:extLst>
+          </a:blip>
+          <a:stretch>
+            <a:fillRect/>
+          </a:stretch>
+        </p:blipFill>
+        <p:spPr>
+          <a:xfrm>
+            <a:off x="9997200" y="6085768"/>
+            <a:ext cx="230400" cy="230400"/>
+          </a:xfrm>
+          <a:prstGeom prst="rect">
+            <a:avLst/>
+          </a:prstGeom>
+        </p:spPr>
+      </p:pic>
       <p:sp>
         <p:nvSpPr>
           <p:cNvPr id="123" name="ShadeSessionCae">
@@ -8511,8 +8674,8 @@
         </p:nvSpPr>
         <p:spPr>
           <a:xfrm>
-            <a:off x="9962193" y="5228902"/>
-            <a:ext cx="1987008" cy="369332"/>
+            <a:off x="9987595" y="5219780"/>
+            <a:ext cx="1938246" cy="369332"/>
           </a:xfrm>
           <a:prstGeom prst="rect">
             <a:avLst/>
@@ -8555,10 +8718,10 @@
       </p:sp>
       <p:sp>
         <p:nvSpPr>
-          <p:cNvPr id="124" name="ShadeSessionDisableResilience">
-            <a:extLst>
-              <a:ext uri="{FF2B5EF4-FFF2-40B4-BE49-F238E27FC236}">
-                <a16:creationId xmlns:a16="http://schemas.microsoft.com/office/drawing/2014/main" id="{479EF5A3-8E90-18AE-60B0-183D3DB21346}"/>
+          <p:cNvPr id="76" name="ShadeSessionSecureSignIn">
+            <a:extLst>
+              <a:ext uri="{FF2B5EF4-FFF2-40B4-BE49-F238E27FC236}">
+                <a16:creationId xmlns:a16="http://schemas.microsoft.com/office/drawing/2014/main" id="{720307BF-3334-D93A-3815-1516A0CB6697}"/>
               </a:ext>
             </a:extLst>
           </p:cNvPr>
@@ -8567,8 +8730,8 @@
         </p:nvSpPr>
         <p:spPr>
           <a:xfrm>
-            <a:off x="9966747" y="5619745"/>
-            <a:ext cx="1987008" cy="369332"/>
+            <a:off x="9996846" y="5986498"/>
+            <a:ext cx="1869089" cy="369332"/>
           </a:xfrm>
           <a:prstGeom prst="rect">
             <a:avLst/>
@@ -8611,10 +8774,10 @@
       </p:sp>
       <p:pic>
         <p:nvPicPr>
-          <p:cNvPr id="70" name="IconAssignedToRole">
-            <a:extLst>
-              <a:ext uri="{FF2B5EF4-FFF2-40B4-BE49-F238E27FC236}">
-                <a16:creationId xmlns:a16="http://schemas.microsoft.com/office/drawing/2014/main" id="{A8B5B9F2-9715-28D8-3E21-42BFCC74E9DE}"/>
+          <p:cNvPr id="102" name="Graphic 101">
+            <a:extLst>
+              <a:ext uri="{FF2B5EF4-FFF2-40B4-BE49-F238E27FC236}">
+                <a16:creationId xmlns:a16="http://schemas.microsoft.com/office/drawing/2014/main" id="{424940AB-E5E5-4BBF-A10E-EC25BC4984D2}"/>
               </a:ext>
             </a:extLst>
           </p:cNvPr>
@@ -8624,10 +8787,10 @@
           <p:nvPr/>
         </p:nvPicPr>
         <p:blipFill>
-          <a:blip r:embed="rId67">
+          <a:blip r:embed="rId74">
             <a:extLst>
               <a:ext uri="{96DAC541-7B7A-43D3-8B79-37D633B846F1}">
-                <asvg:svgBlip xmlns:asvg="http://schemas.microsoft.com/office/drawing/2016/SVG/main" r:embed="rId68"/>
+                <asvg:svgBlip xmlns:asvg="http://schemas.microsoft.com/office/drawing/2016/SVG/main" r:embed="rId75"/>
               </a:ext>
             </a:extLst>
           </a:blip>
@@ -8637,8 +8800,8 @@
         </p:blipFill>
         <p:spPr>
           <a:xfrm>
-            <a:off x="2391841" y="3225674"/>
-            <a:ext cx="365760" cy="365760"/>
+            <a:off x="9997200" y="5663777"/>
+            <a:ext cx="230400" cy="230400"/>
           </a:xfrm>
           <a:prstGeom prst="rect">
             <a:avLst/>
@@ -8647,10 +8810,10 @@
       </p:pic>
       <p:pic>
         <p:nvPicPr>
-          <p:cNvPr id="73" name="IconAssignedToGuest">
-            <a:extLst>
-              <a:ext uri="{FF2B5EF4-FFF2-40B4-BE49-F238E27FC236}">
-                <a16:creationId xmlns:a16="http://schemas.microsoft.com/office/drawing/2014/main" id="{D0269B9B-9063-91D4-5CCB-150E8BCADC85}"/>
+          <p:cNvPr id="80" name="Graphic 79" descr="Close with solid fill">
+            <a:extLst>
+              <a:ext uri="{FF2B5EF4-FFF2-40B4-BE49-F238E27FC236}">
+                <a16:creationId xmlns:a16="http://schemas.microsoft.com/office/drawing/2014/main" id="{CD0219BE-C2D9-FA9F-82F1-670AEE6FF18E}"/>
               </a:ext>
             </a:extLst>
           </p:cNvPr>
@@ -8660,10 +8823,13 @@
           <p:nvPr/>
         </p:nvPicPr>
         <p:blipFill>
-          <a:blip r:embed="rId69">
-            <a:extLst>
+          <a:blip r:embed="rId70">
+            <a:extLst>
+              <a:ext uri="{28A0092B-C50C-407E-A947-70E740481C1C}">
+                <a14:useLocalDpi xmlns:a14="http://schemas.microsoft.com/office/drawing/2010/main" val="0"/>
+              </a:ext>
               <a:ext uri="{96DAC541-7B7A-43D3-8B79-37D633B846F1}">
-                <asvg:svgBlip xmlns:asvg="http://schemas.microsoft.com/office/drawing/2016/SVG/main" r:embed="rId70"/>
+                <asvg:svgBlip xmlns:asvg="http://schemas.microsoft.com/office/drawing/2016/SVG/main" r:embed="rId71"/>
               </a:ext>
             </a:extLst>
           </a:blip>
@@ -8673,103 +8839,70 @@
         </p:blipFill>
         <p:spPr>
           <a:xfrm>
-            <a:off x="2390750" y="2724875"/>
-            <a:ext cx="365760" cy="365760"/>
+            <a:off x="9963899" y="5637424"/>
+            <a:ext cx="296075" cy="296075"/>
           </a:xfrm>
           <a:prstGeom prst="rect">
             <a:avLst/>
           </a:prstGeom>
         </p:spPr>
       </p:pic>
-      <p:pic>
-        <p:nvPicPr>
-          <p:cNvPr id="61" name="PicAccessSecurityInfo" descr="Graphical user interface, text, application, email&#10;&#10;Description automatically generated">
-            <a:extLst>
-              <a:ext uri="{FF2B5EF4-FFF2-40B4-BE49-F238E27FC236}">
-                <a16:creationId xmlns:a16="http://schemas.microsoft.com/office/drawing/2014/main" id="{E018A236-4A83-4263-D21B-8A6DE614E535}"/>
-              </a:ext>
-            </a:extLst>
-          </p:cNvPr>
-          <p:cNvPicPr>
-            <a:picLocks noChangeAspect="1"/>
-          </p:cNvPicPr>
-          <p:nvPr/>
-        </p:nvPicPr>
-        <p:blipFill>
-          <a:blip r:embed="rId71"/>
-          <a:stretch>
-            <a:fillRect/>
-          </a:stretch>
-        </p:blipFill>
-        <p:spPr>
-          <a:xfrm>
-            <a:off x="6019248" y="3736425"/>
-            <a:ext cx="3673090" cy="2094172"/>
-          </a:xfrm>
-          <a:prstGeom prst="rect">
-            <a:avLst/>
-          </a:prstGeom>
-        </p:spPr>
-      </p:pic>
-      <p:pic>
-        <p:nvPicPr>
-          <p:cNvPr id="125" name="PicAccessRegisterDevice" descr="Graphical user interface, application&#10;&#10;Description automatically generated">
-            <a:extLst>
-              <a:ext uri="{FF2B5EF4-FFF2-40B4-BE49-F238E27FC236}">
-                <a16:creationId xmlns:a16="http://schemas.microsoft.com/office/drawing/2014/main" id="{A3B3F247-FF69-447F-E182-652ADEE608FC}"/>
-              </a:ext>
-            </a:extLst>
-          </p:cNvPr>
-          <p:cNvPicPr>
-            <a:picLocks noChangeAspect="1"/>
-          </p:cNvPicPr>
-          <p:nvPr/>
-        </p:nvPicPr>
-        <p:blipFill rotWithShape="1">
-          <a:blip r:embed="rId72"/>
-          <a:srcRect r="4400" b="6054"/>
-          <a:stretch/>
-        </p:blipFill>
-        <p:spPr>
-          <a:xfrm>
-            <a:off x="5896533" y="3744401"/>
-            <a:ext cx="3874103" cy="2163097"/>
-          </a:xfrm>
-          <a:prstGeom prst="rect">
-            <a:avLst/>
-          </a:prstGeom>
-        </p:spPr>
-      </p:pic>
-      <p:pic>
-        <p:nvPicPr>
-          <p:cNvPr id="22" name="PicAccessOffice365" descr="Graphical user interface, application&#10;&#10;Description automatically generated">
-            <a:extLst>
-              <a:ext uri="{FF2B5EF4-FFF2-40B4-BE49-F238E27FC236}">
-                <a16:creationId xmlns:a16="http://schemas.microsoft.com/office/drawing/2014/main" id="{FB86B396-B8F8-888C-26D4-BFF08146B38B}"/>
-              </a:ext>
-            </a:extLst>
-          </p:cNvPr>
-          <p:cNvPicPr>
-            <a:picLocks noChangeAspect="1"/>
-          </p:cNvPicPr>
-          <p:nvPr/>
-        </p:nvPicPr>
-        <p:blipFill>
-          <a:blip r:embed="rId73"/>
-          <a:stretch>
-            <a:fillRect/>
-          </a:stretch>
-        </p:blipFill>
-        <p:spPr>
-          <a:xfrm>
-            <a:off x="6673101" y="3457952"/>
-            <a:ext cx="2328560" cy="3498547"/>
-          </a:xfrm>
-          <a:prstGeom prst="rect">
-            <a:avLst/>
-          </a:prstGeom>
-        </p:spPr>
-      </p:pic>
+      <p:sp>
+        <p:nvSpPr>
+          <p:cNvPr id="124" name="ShadeSessionDisableResilience">
+            <a:extLst>
+              <a:ext uri="{FF2B5EF4-FFF2-40B4-BE49-F238E27FC236}">
+                <a16:creationId xmlns:a16="http://schemas.microsoft.com/office/drawing/2014/main" id="{479EF5A3-8E90-18AE-60B0-183D3DB21346}"/>
+              </a:ext>
+            </a:extLst>
+          </p:cNvPr>
+          <p:cNvSpPr/>
+          <p:nvPr/>
+        </p:nvSpPr>
+        <p:spPr>
+          <a:xfrm>
+            <a:off x="9959681" y="5602709"/>
+            <a:ext cx="1800938" cy="369332"/>
+          </a:xfrm>
+          <a:prstGeom prst="rect">
+            <a:avLst/>
+          </a:prstGeom>
+          <a:solidFill>
+            <a:srgbClr val="FFFFFF">
+              <a:alpha val="92941"/>
+            </a:srgbClr>
+          </a:solidFill>
+          <a:ln>
+            <a:noFill/>
+          </a:ln>
+        </p:spPr>
+        <p:style>
+          <a:lnRef idx="2">
+            <a:schemeClr val="accent1">
+              <a:shade val="50000"/>
+            </a:schemeClr>
+          </a:lnRef>
+          <a:fillRef idx="1">
+            <a:schemeClr val="accent1"/>
+          </a:fillRef>
+          <a:effectRef idx="0">
+            <a:schemeClr val="accent1"/>
+          </a:effectRef>
+          <a:fontRef idx="minor">
+            <a:schemeClr val="lt1"/>
+          </a:fontRef>
+        </p:style>
+        <p:txBody>
+          <a:bodyPr wrap="square" rtlCol="0" anchor="ctr">
+            <a:spAutoFit/>
+          </a:bodyPr>
+          <a:lstStyle/>
+          <a:p>
+            <a:pPr algn="ctr"/>
+            <a:endParaRPr lang="en-US"/>
+          </a:p>
+        </p:txBody>
+      </p:sp>
     </p:spTree>
     <p:extLst>
       <p:ext uri="{BB962C8B-B14F-4D97-AF65-F5344CB8AC3E}">

</xml_diff>

<commit_message>
Added last modified and changed default sort to alphabetical
</commit_message>
<xml_diff>
--- a/src/webapi/wwwroot/assets/PolicyTemplate.pptx
+++ b/src/webapi/wwwroot/assets/PolicyTemplate.pptx
@@ -262,7 +262,7 @@
           <a:p>
             <a:fld id="{CF5C660C-50E5-B242-B3EF-2B7C8DA67512}" type="datetimeFigureOut">
               <a:rPr lang="en-US" smtClean="0"/>
-              <a:t>3/13/23</a:t>
+              <a:t>3/15/23</a:t>
             </a:fld>
             <a:endParaRPr lang="en-US"/>
           </a:p>
@@ -432,7 +432,7 @@
           <a:p>
             <a:fld id="{CF5C660C-50E5-B242-B3EF-2B7C8DA67512}" type="datetimeFigureOut">
               <a:rPr lang="en-US" smtClean="0"/>
-              <a:t>3/13/23</a:t>
+              <a:t>3/15/23</a:t>
             </a:fld>
             <a:endParaRPr lang="en-US"/>
           </a:p>
@@ -612,7 +612,7 @@
           <a:p>
             <a:fld id="{CF5C660C-50E5-B242-B3EF-2B7C8DA67512}" type="datetimeFigureOut">
               <a:rPr lang="en-US" smtClean="0"/>
-              <a:t>3/13/23</a:t>
+              <a:t>3/15/23</a:t>
             </a:fld>
             <a:endParaRPr lang="en-US"/>
           </a:p>
@@ -782,7 +782,7 @@
           <a:p>
             <a:fld id="{CF5C660C-50E5-B242-B3EF-2B7C8DA67512}" type="datetimeFigureOut">
               <a:rPr lang="en-US" smtClean="0"/>
-              <a:t>3/13/23</a:t>
+              <a:t>3/15/23</a:t>
             </a:fld>
             <a:endParaRPr lang="en-US"/>
           </a:p>
@@ -1028,7 +1028,7 @@
           <a:p>
             <a:fld id="{CF5C660C-50E5-B242-B3EF-2B7C8DA67512}" type="datetimeFigureOut">
               <a:rPr lang="en-US" smtClean="0"/>
-              <a:t>3/13/23</a:t>
+              <a:t>3/15/23</a:t>
             </a:fld>
             <a:endParaRPr lang="en-US"/>
           </a:p>
@@ -1260,7 +1260,7 @@
           <a:p>
             <a:fld id="{CF5C660C-50E5-B242-B3EF-2B7C8DA67512}" type="datetimeFigureOut">
               <a:rPr lang="en-US" smtClean="0"/>
-              <a:t>3/13/23</a:t>
+              <a:t>3/15/23</a:t>
             </a:fld>
             <a:endParaRPr lang="en-US"/>
           </a:p>
@@ -1627,7 +1627,7 @@
           <a:p>
             <a:fld id="{CF5C660C-50E5-B242-B3EF-2B7C8DA67512}" type="datetimeFigureOut">
               <a:rPr lang="en-US" smtClean="0"/>
-              <a:t>3/13/23</a:t>
+              <a:t>3/15/23</a:t>
             </a:fld>
             <a:endParaRPr lang="en-US"/>
           </a:p>
@@ -1745,7 +1745,7 @@
           <a:p>
             <a:fld id="{CF5C660C-50E5-B242-B3EF-2B7C8DA67512}" type="datetimeFigureOut">
               <a:rPr lang="en-US" smtClean="0"/>
-              <a:t>3/13/23</a:t>
+              <a:t>3/15/23</a:t>
             </a:fld>
             <a:endParaRPr lang="en-US"/>
           </a:p>
@@ -1840,7 +1840,7 @@
           <a:p>
             <a:fld id="{CF5C660C-50E5-B242-B3EF-2B7C8DA67512}" type="datetimeFigureOut">
               <a:rPr lang="en-US" smtClean="0"/>
-              <a:t>3/13/23</a:t>
+              <a:t>3/15/23</a:t>
             </a:fld>
             <a:endParaRPr lang="en-US"/>
           </a:p>
@@ -2117,7 +2117,7 @@
           <a:p>
             <a:fld id="{CF5C660C-50E5-B242-B3EF-2B7C8DA67512}" type="datetimeFigureOut">
               <a:rPr lang="en-US" smtClean="0"/>
-              <a:t>3/13/23</a:t>
+              <a:t>3/15/23</a:t>
             </a:fld>
             <a:endParaRPr lang="en-US"/>
           </a:p>
@@ -2374,7 +2374,7 @@
           <a:p>
             <a:fld id="{CF5C660C-50E5-B242-B3EF-2B7C8DA67512}" type="datetimeFigureOut">
               <a:rPr lang="en-US" smtClean="0"/>
-              <a:t>3/13/23</a:t>
+              <a:t>3/15/23</a:t>
             </a:fld>
             <a:endParaRPr lang="en-US"/>
           </a:p>
@@ -2587,7 +2587,7 @@
           <a:p>
             <a:fld id="{CF5C660C-50E5-B242-B3EF-2B7C8DA67512}" type="datetimeFigureOut">
               <a:rPr lang="en-US" smtClean="0"/>
-              <a:t>3/13/23</a:t>
+              <a:t>3/15/23</a:t>
             </a:fld>
             <a:endParaRPr lang="en-US"/>
           </a:p>
@@ -4287,41 +4287,6 @@
       </p:sp>
       <p:sp>
         <p:nvSpPr>
-          <p:cNvPr id="2" name="PolicyName">
-            <a:extLst>
-              <a:ext uri="{FF2B5EF4-FFF2-40B4-BE49-F238E27FC236}">
-                <a16:creationId xmlns:a16="http://schemas.microsoft.com/office/drawing/2014/main" id="{048E5F60-3AD0-5994-B186-3CE3900929BB}"/>
-              </a:ext>
-            </a:extLst>
-          </p:cNvPr>
-          <p:cNvSpPr>
-            <a:spLocks noGrp="1"/>
-          </p:cNvSpPr>
-          <p:nvPr>
-            <p:ph type="title"/>
-          </p:nvPr>
-        </p:nvSpPr>
-        <p:spPr>
-          <a:xfrm>
-            <a:off x="838200" y="115511"/>
-            <a:ext cx="10515600" cy="609565"/>
-          </a:xfrm>
-        </p:spPr>
-        <p:txBody>
-          <a:bodyPr>
-            <a:noAutofit/>
-          </a:bodyPr>
-          <a:lstStyle/>
-          <a:p>
-            <a:r>
-              <a:rPr lang="en-US" sz="2000" b="1" dirty="0"/>
-              <a:t>Conditional Access Policy Name</a:t>
-            </a:r>
-          </a:p>
-        </p:txBody>
-      </p:sp>
-      <p:sp>
-        <p:nvSpPr>
           <p:cNvPr id="7" name="UserWorkloadIncExc">
             <a:extLst>
               <a:ext uri="{FF2B5EF4-FFF2-40B4-BE49-F238E27FC236}">
@@ -8900,6 +8865,83 @@
           <a:p>
             <a:pPr algn="ctr"/>
             <a:endParaRPr lang="en-US"/>
+          </a:p>
+        </p:txBody>
+      </p:sp>
+      <p:sp>
+        <p:nvSpPr>
+          <p:cNvPr id="2" name="PolicyName">
+            <a:extLst>
+              <a:ext uri="{FF2B5EF4-FFF2-40B4-BE49-F238E27FC236}">
+                <a16:creationId xmlns:a16="http://schemas.microsoft.com/office/drawing/2014/main" id="{048E5F60-3AD0-5994-B186-3CE3900929BB}"/>
+              </a:ext>
+            </a:extLst>
+          </p:cNvPr>
+          <p:cNvSpPr>
+            <a:spLocks noGrp="1"/>
+          </p:cNvSpPr>
+          <p:nvPr>
+            <p:ph type="title"/>
+          </p:nvPr>
+        </p:nvSpPr>
+        <p:spPr>
+          <a:xfrm>
+            <a:off x="838200" y="115511"/>
+            <a:ext cx="10003967" cy="609565"/>
+          </a:xfrm>
+        </p:spPr>
+        <p:txBody>
+          <a:bodyPr>
+            <a:noAutofit/>
+          </a:bodyPr>
+          <a:lstStyle/>
+          <a:p>
+            <a:r>
+              <a:rPr lang="en-US" sz="2000" b="1" dirty="0"/>
+              <a:t>Conditional Access Policy Name</a:t>
+            </a:r>
+          </a:p>
+        </p:txBody>
+      </p:sp>
+      <p:sp>
+        <p:nvSpPr>
+          <p:cNvPr id="16" name="LastModified">
+            <a:extLst>
+              <a:ext uri="{FF2B5EF4-FFF2-40B4-BE49-F238E27FC236}">
+                <a16:creationId xmlns:a16="http://schemas.microsoft.com/office/drawing/2014/main" id="{CABD7A59-95E2-D723-43ED-E3935A9B5335}"/>
+              </a:ext>
+            </a:extLst>
+          </p:cNvPr>
+          <p:cNvSpPr txBox="1"/>
+          <p:nvPr/>
+        </p:nvSpPr>
+        <p:spPr>
+          <a:xfrm>
+            <a:off x="10831347" y="388376"/>
+            <a:ext cx="1273161" cy="215444"/>
+          </a:xfrm>
+          <a:prstGeom prst="rect">
+            <a:avLst/>
+          </a:prstGeom>
+          <a:noFill/>
+        </p:spPr>
+        <p:txBody>
+          <a:bodyPr wrap="square" rtlCol="0">
+            <a:spAutoFit/>
+          </a:bodyPr>
+          <a:lstStyle/>
+          <a:p>
+            <a:pPr algn="r"/>
+            <a:r>
+              <a:rPr lang="en-US" sz="800" dirty="0">
+                <a:solidFill>
+                  <a:schemeClr val="bg1">
+                    <a:lumMod val="50000"/>
+                  </a:schemeClr>
+                </a:solidFill>
+              </a:rPr>
+              <a:t>Last modified: 2022-00-00</a:t>
+            </a:r>
           </a:p>
         </p:txBody>
       </p:sp>

</xml_diff>

<commit_message>
Added icons for headers
</commit_message>
<xml_diff>
--- a/src/webapi/wwwroot/assets/PolicyTemplate.pptx
+++ b/src/webapi/wwwroot/assets/PolicyTemplate.pptx
@@ -4413,7 +4413,7 @@
         <p:spPr>
           <a:xfrm>
             <a:off x="8324941" y="1021947"/>
-            <a:ext cx="3513703" cy="1592588"/>
+            <a:ext cx="3513702" cy="1592588"/>
           </a:xfrm>
           <a:prstGeom prst="rect">
             <a:avLst/>
@@ -4482,7 +4482,7 @@
         </p:nvSpPr>
         <p:spPr>
           <a:xfrm>
-            <a:off x="5818151" y="1095590"/>
+            <a:off x="5818151" y="1022762"/>
             <a:ext cx="2248808" cy="1648514"/>
           </a:xfrm>
           <a:prstGeom prst="rect">

</xml_diff>

<commit_message>
Added formatting for includes and exclude text
</commit_message>
<xml_diff>
--- a/src/webapi/wwwroot/assets/PolicyTemplate.pptx
+++ b/src/webapi/wwwroot/assets/PolicyTemplate.pptx
@@ -4033,7 +4033,7 @@
         <p:spPr>
           <a:xfrm>
             <a:off x="310122" y="6539219"/>
-            <a:ext cx="918841" cy="253916"/>
+            <a:ext cx="1154483" cy="253916"/>
           </a:xfrm>
           <a:prstGeom prst="rect">
             <a:avLst/>
@@ -4059,7 +4059,7 @@
                   </a:extLst>
                 </a:hlinkClick>
               </a:rPr>
-              <a:t>idPowerToys</a:t>
+              <a:t>idPowerToys.com</a:t>
             </a:r>
             <a:endParaRPr lang="en-US" sz="1050" dirty="0">
               <a:solidFill>

</xml_diff>